<commit_message>
added redis and Rest
</commit_message>
<xml_diff>
--- a/Project_Submission/Presentation.pptx
+++ b/Project_Submission/Presentation.pptx
@@ -5660,8 +5660,8 @@
         </p:nvSpPr>
         <p:spPr bwMode="auto">
           <a:xfrm flipH="0" flipV="0">
-            <a:off x="238886" y="3705224"/>
-            <a:ext cx="8779449" cy="914760"/>
+            <a:off x="238885" y="3705223"/>
+            <a:ext cx="8791328" cy="914760"/>
           </a:xfrm>
           <a:prstGeom prst="rect">
             <a:avLst/>
@@ -5678,7 +5678,7 @@
             </a:pPr>
             <a:r>
               <a:rPr/>
-              <a:t>Edge-Cloud communication using MQTT Protocol, with an additional overhead for sending the packages of 0.032s between packages. The package message is 44 bytes, with 27 bytes corresponding to the Topic.</a:t>
+              <a:t>Edge-Cloud communication using MQTT Protocol, with an additional overhead for sending the packages of 0.032s between packages. The package message is 44 bytes, with 27 bytes corresponding to the Topic and could be further optimized.</a:t>
             </a:r>
             <a:endParaRPr/>
           </a:p>
@@ -5871,8 +5871,8 @@
         </p:nvSpPr>
         <p:spPr bwMode="auto">
           <a:xfrm flipH="0" flipV="0">
-            <a:off x="238885" y="3705223"/>
-            <a:ext cx="8779448" cy="914760"/>
+            <a:off x="220806" y="3962696"/>
+            <a:ext cx="8868007" cy="914760"/>
           </a:xfrm>
           <a:prstGeom prst="rect">
             <a:avLst/>
@@ -5889,7 +5889,7 @@
             </a:pPr>
             <a:r>
               <a:rPr/>
-              <a:t>Edge-Cloud communication using MQTT Protocol, with an additional overhead for sending the packages of 0.032s between packages. The package message is 44 bytes, with 27 bytes corresponding to the Topic.</a:t>
+              <a:t>Package for adding an element to the timeseries on a redis server, most of the communication cannot be optimized and it runs on a TCP protocol, thus requiring the redis server to send an aknowledge and adding additional timing.</a:t>
             </a:r>
             <a:endParaRPr/>
           </a:p>
@@ -5935,6 +5935,28 @@
           </a:p>
         </p:txBody>
       </p:sp>
+      <p:pic>
+        <p:nvPicPr>
+          <p:cNvPr id="970455713" name=""/>
+          <p:cNvPicPr>
+            <a:picLocks noChangeAspect="1"/>
+          </p:cNvPicPr>
+          <p:nvPr/>
+        </p:nvPicPr>
+        <p:blipFill>
+          <a:blip r:embed="rId2"/>
+          <a:stretch/>
+        </p:blipFill>
+        <p:spPr bwMode="auto">
+          <a:xfrm flipH="0" flipV="0">
+            <a:off x="119824" y="1065184"/>
+            <a:ext cx="8901665" cy="2695748"/>
+          </a:xfrm>
+          <a:prstGeom prst="rect">
+            <a:avLst/>
+          </a:prstGeom>
+        </p:spPr>
+      </p:pic>
     </p:spTree>
   </p:cSld>
   <p:clrMapOvr>
@@ -6054,38 +6076,6 @@
       </p:cxnSp>
       <p:sp>
         <p:nvSpPr>
-          <p:cNvPr id="1737196924" name=""/>
-          <p:cNvSpPr txBox="1"/>
-          <p:nvPr/>
-        </p:nvSpPr>
-        <p:spPr bwMode="auto">
-          <a:xfrm flipH="0" flipV="0">
-            <a:off x="238885" y="3705223"/>
-            <a:ext cx="8779448" cy="914760"/>
-          </a:xfrm>
-          <a:prstGeom prst="rect">
-            <a:avLst/>
-          </a:prstGeom>
-          <a:noFill/>
-        </p:spPr>
-        <p:txBody>
-          <a:bodyPr vertOverflow="overflow" horzOverflow="overflow" vert="horz" wrap="square" lIns="91440" tIns="45720" rIns="91440" bIns="45720" numCol="1" spcCol="0" rtlCol="0" fromWordArt="0" anchor="t" anchorCtr="0" forceAA="0" upright="0" compatLnSpc="0">
-            <a:spAutoFit/>
-          </a:bodyPr>
-          <a:p>
-            <a:pPr>
-              <a:defRPr/>
-            </a:pPr>
-            <a:r>
-              <a:rPr/>
-              <a:t>Edge-Cloud communication using MQTT Protocol, with an additional overhead for sending the packages of 0.032s between packages. The package message is 44 bytes, with 27 bytes corresponding to the Topic.</a:t>
-            </a:r>
-            <a:endParaRPr/>
-          </a:p>
-        </p:txBody>
-      </p:sp>
-      <p:sp>
-        <p:nvSpPr>
           <p:cNvPr id="656646015" name="CasellaDiTesto 2"/>
           <p:cNvSpPr txBox="1"/>
           <p:nvPr/>
@@ -6124,6 +6114,290 @@
           </a:p>
         </p:txBody>
       </p:sp>
+      <p:sp>
+        <p:nvSpPr>
+          <p:cNvPr id="1251678922" name=""/>
+          <p:cNvSpPr/>
+          <p:nvPr/>
+        </p:nvSpPr>
+        <p:spPr bwMode="auto">
+          <a:xfrm flipH="0" flipV="0">
+            <a:off x="3668941" y="1395114"/>
+            <a:ext cx="1629667" cy="1071562"/>
+          </a:xfrm>
+          <a:prstGeom prst="ellipse">
+            <a:avLst/>
+          </a:prstGeom>
+          <a:solidFill>
+            <a:schemeClr val="accent6">
+              <a:lumMod val="60000"/>
+              <a:lumOff val="40000"/>
+            </a:schemeClr>
+          </a:solidFill>
+          <a:ln w="25400" cap="flat" cmpd="sng" algn="ctr">
+            <a:solidFill>
+              <a:schemeClr val="tx1"/>
+            </a:solidFill>
+            <a:prstDash val="solid"/>
+            <a:miter/>
+          </a:ln>
+        </p:spPr>
+        <p:style>
+          <a:lnRef idx="2">
+            <a:schemeClr val="accent1">
+              <a:shade val="50000"/>
+            </a:schemeClr>
+          </a:lnRef>
+          <a:fillRef idx="1">
+            <a:schemeClr val="accent1"/>
+          </a:fillRef>
+          <a:effectRef idx="0">
+            <a:schemeClr val="accent1"/>
+          </a:effectRef>
+          <a:fontRef idx="minor">
+            <a:schemeClr val="lt1"/>
+          </a:fontRef>
+        </p:style>
+        <p:txBody>
+          <a:bodyPr/>
+          <a:p>
+            <a:pPr algn="ctr">
+              <a:defRPr/>
+            </a:pPr>
+            <a:r>
+              <a:rPr sz="2600" b="1">
+                <a:solidFill>
+                  <a:schemeClr val="tx1"/>
+                </a:solidFill>
+              </a:rPr>
+              <a:t>Root</a:t>
+            </a:r>
+            <a:endParaRPr b="1">
+              <a:solidFill>
+                <a:schemeClr val="tx1"/>
+              </a:solidFill>
+            </a:endParaRPr>
+          </a:p>
+        </p:txBody>
+      </p:sp>
+      <p:sp>
+        <p:nvSpPr>
+          <p:cNvPr id="381614394" name=""/>
+          <p:cNvSpPr/>
+          <p:nvPr/>
+        </p:nvSpPr>
+        <p:spPr bwMode="auto">
+          <a:xfrm flipH="0" flipV="0">
+            <a:off x="2039274" y="2856904"/>
+            <a:ext cx="1629666" cy="1071561"/>
+          </a:xfrm>
+          <a:prstGeom prst="ellipse">
+            <a:avLst/>
+          </a:prstGeom>
+          <a:solidFill>
+            <a:schemeClr val="accent6">
+              <a:lumMod val="60000"/>
+              <a:lumOff val="40000"/>
+            </a:schemeClr>
+          </a:solidFill>
+          <a:ln w="25400" cap="flat" cmpd="sng" algn="ctr">
+            <a:solidFill>
+              <a:schemeClr val="tx1"/>
+            </a:solidFill>
+            <a:prstDash val="solid"/>
+            <a:miter/>
+          </a:ln>
+        </p:spPr>
+        <p:style>
+          <a:lnRef idx="2">
+            <a:schemeClr val="accent1">
+              <a:shade val="50000"/>
+            </a:schemeClr>
+          </a:lnRef>
+          <a:fillRef idx="1">
+            <a:schemeClr val="accent1"/>
+          </a:fillRef>
+          <a:effectRef idx="0">
+            <a:schemeClr val="accent1"/>
+          </a:effectRef>
+          <a:fontRef idx="minor">
+            <a:schemeClr val="lt1"/>
+          </a:fontRef>
+        </p:style>
+        <p:txBody>
+          <a:bodyPr/>
+          <a:p>
+            <a:pPr>
+              <a:defRPr/>
+            </a:pPr>
+            <a:r>
+              <a:rPr lang="it-IT" sz="2000" b="1" i="0" u="none" strike="noStrike" cap="none" spc="0">
+                <a:solidFill>
+                  <a:schemeClr val="tx1"/>
+                </a:solidFill>
+                <a:latin typeface="+mn-lt"/>
+                <a:ea typeface="+mn-ea"/>
+                <a:cs typeface="+mn-cs"/>
+              </a:rPr>
+              <a:t>Devices</a:t>
+            </a:r>
+            <a:endParaRPr/>
+          </a:p>
+        </p:txBody>
+      </p:sp>
+      <p:sp>
+        <p:nvSpPr>
+          <p:cNvPr id="2049705959" name=""/>
+          <p:cNvSpPr/>
+          <p:nvPr/>
+        </p:nvSpPr>
+        <p:spPr bwMode="auto">
+          <a:xfrm flipH="0" flipV="0">
+            <a:off x="5261402" y="2856904"/>
+            <a:ext cx="1629666" cy="1071561"/>
+          </a:xfrm>
+          <a:prstGeom prst="ellipse">
+            <a:avLst/>
+          </a:prstGeom>
+          <a:solidFill>
+            <a:schemeClr val="accent6">
+              <a:lumMod val="60000"/>
+              <a:lumOff val="40000"/>
+            </a:schemeClr>
+          </a:solidFill>
+          <a:ln w="25400" cap="flat" cmpd="sng" algn="ctr">
+            <a:solidFill>
+              <a:schemeClr val="tx1"/>
+            </a:solidFill>
+            <a:prstDash val="solid"/>
+            <a:miter/>
+          </a:ln>
+        </p:spPr>
+        <p:style>
+          <a:lnRef idx="2">
+            <a:schemeClr val="accent1">
+              <a:shade val="50000"/>
+            </a:schemeClr>
+          </a:lnRef>
+          <a:fillRef idx="1">
+            <a:schemeClr val="accent1"/>
+          </a:fillRef>
+          <a:effectRef idx="0">
+            <a:schemeClr val="accent1"/>
+          </a:effectRef>
+          <a:fontRef idx="minor">
+            <a:schemeClr val="lt1"/>
+          </a:fontRef>
+        </p:style>
+        <p:txBody>
+          <a:bodyPr/>
+          <a:p>
+            <a:pPr>
+              <a:defRPr/>
+            </a:pPr>
+            <a:r>
+              <a:rPr lang="it-IT" sz="1800" b="1" i="0" u="none" strike="noStrike" cap="none" spc="0">
+                <a:solidFill>
+                  <a:schemeClr val="tx1"/>
+                </a:solidFill>
+                <a:latin typeface="Arial"/>
+                <a:ea typeface="DejaVu Sans"/>
+                <a:cs typeface="DejaVu Sans"/>
+              </a:rPr>
+              <a:t>Device</a:t>
+            </a:r>
+            <a:endParaRPr/>
+          </a:p>
+        </p:txBody>
+      </p:sp>
+      <p:cxnSp>
+        <p:nvCxnSpPr>
+          <p:cNvPr id="0" name=""/>
+          <p:cNvCxnSpPr>
+            <a:cxnSpLocks/>
+            <a:stCxn id="1251678922" idx="3"/>
+            <a:endCxn id="381614394" idx="7"/>
+          </p:cNvCxnSpPr>
+          <p:nvPr/>
+        </p:nvCxnSpPr>
+        <p:spPr bwMode="auto">
+          <a:xfrm rot="5399978" flipH="0" flipV="0">
+            <a:off x="3316901" y="2423131"/>
+            <a:ext cx="704081" cy="477317"/>
+          </a:xfrm>
+          <a:prstGeom prst="line">
+            <a:avLst/>
+          </a:prstGeom>
+          <a:ln w="57150" cap="flat" cmpd="sng" algn="ctr">
+            <a:solidFill>
+              <a:schemeClr val="tx1"/>
+            </a:solidFill>
+            <a:prstDash val="solid"/>
+            <a:miter/>
+            <a:tailEnd type="arrow" len="med"/>
+          </a:ln>
+        </p:spPr>
+        <p:style>
+          <a:lnRef idx="1">
+            <a:schemeClr val="accent1">
+              <a:shade val="50000"/>
+            </a:schemeClr>
+          </a:lnRef>
+          <a:fillRef idx="0">
+            <a:schemeClr val="accent1"/>
+          </a:fillRef>
+          <a:effectRef idx="0">
+            <a:schemeClr val="accent1"/>
+          </a:effectRef>
+          <a:fontRef idx="minor">
+            <a:schemeClr val="tx1"/>
+          </a:fontRef>
+        </p:style>
+      </p:cxnSp>
+      <p:cxnSp>
+        <p:nvCxnSpPr>
+          <p:cNvPr id="0" name=""/>
+          <p:cNvCxnSpPr>
+            <a:cxnSpLocks/>
+            <a:stCxn id="1251678922" idx="5"/>
+            <a:endCxn id="2049705959" idx="1"/>
+          </p:cNvCxnSpPr>
+          <p:nvPr/>
+        </p:nvCxnSpPr>
+        <p:spPr bwMode="auto">
+          <a:xfrm rot="5399978" flipH="0" flipV="1">
+            <a:off x="4927965" y="2441735"/>
+            <a:ext cx="704081" cy="440111"/>
+          </a:xfrm>
+          <a:prstGeom prst="line">
+            <a:avLst/>
+          </a:prstGeom>
+          <a:ln w="57150" cap="flat" cmpd="sng" algn="ctr">
+            <a:solidFill>
+              <a:schemeClr val="tx1"/>
+            </a:solidFill>
+            <a:prstDash val="solid"/>
+            <a:miter/>
+            <a:tailEnd type="arrow" len="med"/>
+          </a:ln>
+        </p:spPr>
+        <p:style>
+          <a:lnRef idx="1">
+            <a:schemeClr val="accent1">
+              <a:shade val="50000"/>
+            </a:schemeClr>
+          </a:lnRef>
+          <a:fillRef idx="0">
+            <a:schemeClr val="accent1"/>
+          </a:fillRef>
+          <a:effectRef idx="0">
+            <a:schemeClr val="accent1"/>
+          </a:effectRef>
+          <a:fontRef idx="minor">
+            <a:schemeClr val="tx1"/>
+          </a:fontRef>
+        </p:style>
+      </p:cxnSp>
     </p:spTree>
   </p:cSld>
   <p:clrMapOvr>

</xml_diff>

<commit_message>
upload the model optimization
</commit_message>
<xml_diff>
--- a/Project_Submission/Presentation.pptx
+++ b/Project_Submission/Presentation.pptx
@@ -4837,6 +4837,10 @@
             <a:pPr algn="ctr">
               <a:defRPr/>
             </a:pPr>
+            <a:r>
+              <a:rPr lang="en-US"/>
+              <a:t>        </a:t>
+            </a:r>
             <a:endParaRPr lang="en-US"/>
           </a:p>
         </p:txBody>
@@ -8845,7 +8849,7 @@
         </p:nvSpPr>
         <p:spPr bwMode="auto">
           <a:xfrm flipH="0" flipV="0">
-            <a:off x="3818201" y="1480838"/>
+            <a:off x="3818201" y="1480837"/>
             <a:ext cx="4451391" cy="1189079"/>
           </a:xfrm>
           <a:prstGeom prst="rect">
@@ -9485,6 +9489,114 @@
           </a:fontRef>
         </p:style>
       </p:cxnSp>
+      <p:pic>
+        <p:nvPicPr>
+          <p:cNvPr id="262918332" name=""/>
+          <p:cNvPicPr>
+            <a:picLocks noChangeAspect="1"/>
+          </p:cNvPicPr>
+          <p:nvPr/>
+        </p:nvPicPr>
+        <p:blipFill>
+          <a:blip r:embed="rId2"/>
+          <a:stretch/>
+        </p:blipFill>
+        <p:spPr bwMode="auto">
+          <a:xfrm flipH="0" flipV="0">
+            <a:off x="5163903" y="2081807"/>
+            <a:ext cx="3756850" cy="1223525"/>
+          </a:xfrm>
+          <a:prstGeom prst="rect">
+            <a:avLst/>
+          </a:prstGeom>
+        </p:spPr>
+      </p:pic>
+      <p:pic>
+        <p:nvPicPr>
+          <p:cNvPr id="428030264" name=""/>
+          <p:cNvPicPr>
+            <a:picLocks noChangeAspect="1"/>
+          </p:cNvPicPr>
+          <p:nvPr/>
+        </p:nvPicPr>
+        <p:blipFill>
+          <a:blip r:embed="rId3"/>
+          <a:stretch/>
+        </p:blipFill>
+        <p:spPr bwMode="auto">
+          <a:xfrm flipH="0" flipV="0">
+            <a:off x="40394" y="1458078"/>
+            <a:ext cx="4570315" cy="2265759"/>
+          </a:xfrm>
+          <a:prstGeom prst="rect">
+            <a:avLst/>
+          </a:prstGeom>
+        </p:spPr>
+      </p:pic>
+      <p:sp>
+        <p:nvSpPr>
+          <p:cNvPr id="110610465" name=""/>
+          <p:cNvSpPr txBox="1"/>
+          <p:nvPr/>
+        </p:nvSpPr>
+        <p:spPr bwMode="auto">
+          <a:xfrm flipH="0" flipV="0">
+            <a:off x="412752" y="3943945"/>
+            <a:ext cx="3827038" cy="640440"/>
+          </a:xfrm>
+          <a:prstGeom prst="rect">
+            <a:avLst/>
+          </a:prstGeom>
+          <a:noFill/>
+        </p:spPr>
+        <p:txBody>
+          <a:bodyPr vertOverflow="overflow" horzOverflow="overflow" vert="horz" wrap="square" lIns="91440" tIns="45720" rIns="91440" bIns="45720" numCol="1" spcCol="0" rtlCol="0" fromWordArt="0" anchor="t" anchorCtr="0" forceAA="0" upright="0" compatLnSpc="0">
+            <a:spAutoFit/>
+          </a:bodyPr>
+          <a:p>
+            <a:pPr>
+              <a:defRPr/>
+            </a:pPr>
+            <a:r>
+              <a:rPr/>
+              <a:t>Neural network that uses DS convolutional layers</a:t>
+            </a:r>
+            <a:endParaRPr/>
+          </a:p>
+        </p:txBody>
+      </p:sp>
+      <p:sp>
+        <p:nvSpPr>
+          <p:cNvPr id="1642235389" name=""/>
+          <p:cNvSpPr txBox="1"/>
+          <p:nvPr/>
+        </p:nvSpPr>
+        <p:spPr bwMode="auto">
+          <a:xfrm flipH="0" flipV="0">
+            <a:off x="5339234" y="3611615"/>
+            <a:ext cx="3503060" cy="1189079"/>
+          </a:xfrm>
+          <a:prstGeom prst="rect">
+            <a:avLst/>
+          </a:prstGeom>
+          <a:noFill/>
+        </p:spPr>
+        <p:txBody>
+          <a:bodyPr vertOverflow="overflow" horzOverflow="overflow" vert="horz" wrap="square" lIns="91440" tIns="45720" rIns="91440" bIns="45720" numCol="1" spcCol="0" rtlCol="0" fromWordArt="0" anchor="t" anchorCtr="0" forceAA="0" upright="0" compatLnSpc="0">
+            <a:spAutoFit/>
+          </a:bodyPr>
+          <a:p>
+            <a:pPr>
+              <a:defRPr/>
+            </a:pPr>
+            <a:r>
+              <a:rPr/>
+              <a:t>Width Scaling for reducing model complexity and this reducing time required for training</a:t>
+            </a:r>
+            <a:endParaRPr/>
+          </a:p>
+        </p:txBody>
+      </p:sp>
     </p:spTree>
   </p:cSld>
   <p:clrMapOvr>

</xml_diff>